<commit_message>
update code / notes
</commit_message>
<xml_diff>
--- a/notes/complexity.pptx
+++ b/notes/complexity.pptx
@@ -231,7 +231,7 @@
           <a:p>
             <a:fld id="{8A1B613A-EFF1-404F-BEE8-EFAE84A4E5E2}" type="datetimeFigureOut">
               <a:rPr lang="en-US" smtClean="0"/>
-              <a:t>2/7/20</a:t>
+              <a:t>3/31/21</a:t>
             </a:fld>
             <a:endParaRPr lang="en-US"/>
           </a:p>
@@ -396,7 +396,7 @@
           <a:p>
             <a:fld id="{690847EA-AC25-3D4E-89E1-FD3F6A9702B6}" type="datetimeFigureOut">
               <a:rPr lang="en-US" smtClean="0"/>
-              <a:t>2/7/20</a:t>
+              <a:t>3/31/21</a:t>
             </a:fld>
             <a:endParaRPr lang="en-US"/>
           </a:p>
@@ -831,6 +831,90 @@
 </p:notes>
 </file>
 
+<file path=ppt/notesSlides/notesSlide3.xml><?xml version="1.0" encoding="utf-8"?>
+<p:notes xmlns:a="http://schemas.openxmlformats.org/drawingml/2006/main" xmlns:r="http://schemas.openxmlformats.org/officeDocument/2006/relationships" xmlns:p="http://schemas.openxmlformats.org/presentationml/2006/main">
+  <p:cSld>
+    <p:spTree>
+      <p:nvGrpSpPr>
+        <p:cNvPr id="1" name=""/>
+        <p:cNvGrpSpPr/>
+        <p:nvPr/>
+      </p:nvGrpSpPr>
+      <p:grpSpPr>
+        <a:xfrm>
+          <a:off x="0" y="0"/>
+          <a:ext cx="0" cy="0"/>
+          <a:chOff x="0" y="0"/>
+          <a:chExt cx="0" cy="0"/>
+        </a:xfrm>
+      </p:grpSpPr>
+      <p:sp>
+        <p:nvSpPr>
+          <p:cNvPr id="2" name="Slide Image Placeholder 1"/>
+          <p:cNvSpPr>
+            <a:spLocks noGrp="1" noRot="1" noChangeAspect="1"/>
+          </p:cNvSpPr>
+          <p:nvPr>
+            <p:ph type="sldImg"/>
+          </p:nvPr>
+        </p:nvSpPr>
+        <p:spPr/>
+      </p:sp>
+      <p:sp>
+        <p:nvSpPr>
+          <p:cNvPr id="3" name="Notes Placeholder 2"/>
+          <p:cNvSpPr>
+            <a:spLocks noGrp="1"/>
+          </p:cNvSpPr>
+          <p:nvPr>
+            <p:ph type="body" idx="1"/>
+          </p:nvPr>
+        </p:nvSpPr>
+        <p:spPr/>
+        <p:txBody>
+          <a:bodyPr/>
+          <a:lstStyle/>
+          <a:p>
+            <a:endParaRPr lang="en-US" dirty="0"/>
+          </a:p>
+        </p:txBody>
+      </p:sp>
+      <p:sp>
+        <p:nvSpPr>
+          <p:cNvPr id="4" name="Slide Number Placeholder 3"/>
+          <p:cNvSpPr>
+            <a:spLocks noGrp="1"/>
+          </p:cNvSpPr>
+          <p:nvPr>
+            <p:ph type="sldNum" sz="quarter" idx="5"/>
+          </p:nvPr>
+        </p:nvSpPr>
+        <p:spPr/>
+        <p:txBody>
+          <a:bodyPr/>
+          <a:lstStyle/>
+          <a:p>
+            <a:fld id="{0DEC4948-0B79-D842-B740-510D19298355}" type="slidenum">
+              <a:rPr lang="en-US" smtClean="0"/>
+              <a:t>24</a:t>
+            </a:fld>
+            <a:endParaRPr lang="en-US"/>
+          </a:p>
+        </p:txBody>
+      </p:sp>
+    </p:spTree>
+    <p:extLst>
+      <p:ext uri="{BB962C8B-B14F-4D97-AF65-F5344CB8AC3E}">
+        <p14:creationId xmlns:p14="http://schemas.microsoft.com/office/powerpoint/2010/main" val="2057396195"/>
+      </p:ext>
+    </p:extLst>
+  </p:cSld>
+  <p:clrMapOvr>
+    <a:masterClrMapping/>
+  </p:clrMapOvr>
+</p:notes>
+</file>
+
 <file path=ppt/slideLayouts/slideLayout1.xml><?xml version="1.0" encoding="utf-8"?>
 <p:sldLayout xmlns:a="http://schemas.openxmlformats.org/drawingml/2006/main" xmlns:r="http://schemas.openxmlformats.org/officeDocument/2006/relationships" xmlns:p="http://schemas.openxmlformats.org/presentationml/2006/main" type="title" preserve="1">
   <p:cSld name="Title Slide">
@@ -988,7 +1072,7 @@
           <a:p>
             <a:fld id="{BE5295ED-3BAF-1140-8495-3D368771D6B1}" type="datetimeFigureOut">
               <a:rPr lang="en-US" smtClean="0"/>
-              <a:t>2/7/20</a:t>
+              <a:t>3/31/21</a:t>
             </a:fld>
             <a:endParaRPr lang="en-US"/>
           </a:p>
@@ -1186,7 +1270,7 @@
           <a:p>
             <a:fld id="{BE5295ED-3BAF-1140-8495-3D368771D6B1}" type="datetimeFigureOut">
               <a:rPr lang="en-US" smtClean="0"/>
-              <a:t>2/7/20</a:t>
+              <a:t>3/31/21</a:t>
             </a:fld>
             <a:endParaRPr lang="en-US"/>
           </a:p>
@@ -1394,7 +1478,7 @@
           <a:p>
             <a:fld id="{BE5295ED-3BAF-1140-8495-3D368771D6B1}" type="datetimeFigureOut">
               <a:rPr lang="en-US" smtClean="0"/>
-              <a:t>2/7/20</a:t>
+              <a:t>3/31/21</a:t>
             </a:fld>
             <a:endParaRPr lang="en-US"/>
           </a:p>
@@ -1597,7 +1681,7 @@
           <a:p>
             <a:fld id="{BE5295ED-3BAF-1140-8495-3D368771D6B1}" type="datetimeFigureOut">
               <a:rPr lang="en-US" smtClean="0"/>
-              <a:t>2/7/20</a:t>
+              <a:t>3/31/21</a:t>
             </a:fld>
             <a:endParaRPr lang="en-US"/>
           </a:p>
@@ -1872,7 +1956,7 @@
           <a:p>
             <a:fld id="{BE5295ED-3BAF-1140-8495-3D368771D6B1}" type="datetimeFigureOut">
               <a:rPr lang="en-US" smtClean="0"/>
-              <a:t>2/7/20</a:t>
+              <a:t>3/31/21</a:t>
             </a:fld>
             <a:endParaRPr lang="en-US"/>
           </a:p>
@@ -2137,7 +2221,7 @@
           <a:p>
             <a:fld id="{BE5295ED-3BAF-1140-8495-3D368771D6B1}" type="datetimeFigureOut">
               <a:rPr lang="en-US" smtClean="0"/>
-              <a:t>2/7/20</a:t>
+              <a:t>3/31/21</a:t>
             </a:fld>
             <a:endParaRPr lang="en-US"/>
           </a:p>
@@ -2549,7 +2633,7 @@
           <a:p>
             <a:fld id="{BE5295ED-3BAF-1140-8495-3D368771D6B1}" type="datetimeFigureOut">
               <a:rPr lang="en-US" smtClean="0"/>
-              <a:t>2/7/20</a:t>
+              <a:t>3/31/21</a:t>
             </a:fld>
             <a:endParaRPr lang="en-US"/>
           </a:p>
@@ -2690,7 +2774,7 @@
           <a:p>
             <a:fld id="{BE5295ED-3BAF-1140-8495-3D368771D6B1}" type="datetimeFigureOut">
               <a:rPr lang="en-US" smtClean="0"/>
-              <a:t>2/7/20</a:t>
+              <a:t>3/31/21</a:t>
             </a:fld>
             <a:endParaRPr lang="en-US"/>
           </a:p>
@@ -2803,7 +2887,7 @@
           <a:p>
             <a:fld id="{BE5295ED-3BAF-1140-8495-3D368771D6B1}" type="datetimeFigureOut">
               <a:rPr lang="en-US" smtClean="0"/>
-              <a:t>2/7/20</a:t>
+              <a:t>3/31/21</a:t>
             </a:fld>
             <a:endParaRPr lang="en-US"/>
           </a:p>
@@ -3114,7 +3198,7 @@
           <a:p>
             <a:fld id="{BE5295ED-3BAF-1140-8495-3D368771D6B1}" type="datetimeFigureOut">
               <a:rPr lang="en-US" smtClean="0"/>
-              <a:t>2/7/20</a:t>
+              <a:t>3/31/21</a:t>
             </a:fld>
             <a:endParaRPr lang="en-US"/>
           </a:p>
@@ -3405,7 +3489,7 @@
           <a:p>
             <a:fld id="{BE5295ED-3BAF-1140-8495-3D368771D6B1}" type="datetimeFigureOut">
               <a:rPr lang="en-US" smtClean="0"/>
-              <a:t>2/7/20</a:t>
+              <a:t>3/31/21</a:t>
             </a:fld>
             <a:endParaRPr lang="en-US"/>
           </a:p>
@@ -3650,7 +3734,7 @@
           <a:p>
             <a:fld id="{BE5295ED-3BAF-1140-8495-3D368771D6B1}" type="datetimeFigureOut">
               <a:rPr lang="en-US" smtClean="0"/>
-              <a:t>2/7/20</a:t>
+              <a:t>3/31/21</a:t>
             </a:fld>
             <a:endParaRPr lang="en-US"/>
           </a:p>
@@ -4297,99 +4381,462 @@
           </a:p>
         </p:txBody>
       </p:sp>
-      <p:sp>
-        <p:nvSpPr>
-          <p:cNvPr id="3" name="Content Placeholder 2"/>
-          <p:cNvSpPr>
-            <a:spLocks noGrp="1"/>
-          </p:cNvSpPr>
-          <p:nvPr>
-            <p:ph idx="1"/>
-          </p:nvPr>
-        </p:nvSpPr>
-        <p:spPr/>
-        <p:txBody>
-          <a:bodyPr>
-            <a:normAutofit lnSpcReduction="10000"/>
-          </a:bodyPr>
-          <a:lstStyle/>
-          <a:p>
-            <a:r>
-              <a:rPr lang="en-US" dirty="0"/>
-              <a:t>We care about growth in effort given growth in input; i.e., what is the marginal cost to increase n to n+1?</a:t>
-            </a:r>
-          </a:p>
-          <a:p>
-            <a:r>
-              <a:rPr lang="en-US" dirty="0"/>
-              <a:t>The best picture comes from imagining </a:t>
-            </a:r>
-            <a:r>
-              <a:rPr lang="en-US" i="1" dirty="0"/>
-              <a:t>n</a:t>
-            </a:r>
-            <a:r>
-              <a:rPr lang="en-US" dirty="0"/>
-              <a:t> getting very big and the worst-case input scenario</a:t>
-            </a:r>
-          </a:p>
-          <a:p>
-            <a:r>
-              <a:rPr lang="en-US" dirty="0"/>
-              <a:t>This asymptotic behavior is called “big O” notation </a:t>
-            </a:r>
-            <a:r>
-              <a:rPr lang="en-US" i="1" dirty="0"/>
-              <a:t>O(n)</a:t>
-            </a:r>
-            <a:endParaRPr lang="en-US" dirty="0"/>
-          </a:p>
-          <a:p>
-            <a:r>
-              <a:rPr lang="en-US" dirty="0"/>
-              <a:t>Therefore, ignore constants, keep only most important terms:</a:t>
-            </a:r>
-          </a:p>
-          <a:p>
-            <a:pPr lvl="1"/>
-            <a:r>
-              <a:rPr lang="en-US" dirty="0"/>
-              <a:t>T(n) = 2n implies O(n)</a:t>
-            </a:r>
-          </a:p>
-          <a:p>
-            <a:pPr lvl="1"/>
-            <a:r>
-              <a:rPr lang="en-US" dirty="0"/>
-              <a:t>T(n) = n^3 + kn^2 + </a:t>
-            </a:r>
-            <a:r>
-              <a:rPr lang="en-US" dirty="0" err="1"/>
-              <a:t>nlogn</a:t>
-            </a:r>
-            <a:r>
-              <a:rPr lang="en-US" dirty="0"/>
-              <a:t> implies O(n^3)</a:t>
-            </a:r>
-          </a:p>
-          <a:p>
-            <a:pPr lvl="1"/>
-            <a:r>
-              <a:rPr lang="en-US" dirty="0"/>
-              <a:t>T(n) = k implies O(1)</a:t>
-            </a:r>
-          </a:p>
-          <a:p>
-            <a:r>
-              <a:rPr lang="en-US" dirty="0"/>
-              <a:t>E.g., 3n! and 10n! are indistinguishable asymptotically</a:t>
-            </a:r>
-          </a:p>
-          <a:p>
-            <a:endParaRPr lang="en-US" dirty="0"/>
-          </a:p>
-        </p:txBody>
-      </p:sp>
+      <mc:AlternateContent xmlns:mc="http://schemas.openxmlformats.org/markup-compatibility/2006" xmlns:a14="http://schemas.microsoft.com/office/drawing/2010/main">
+        <mc:Choice Requires="a14">
+          <p:sp>
+            <p:nvSpPr>
+              <p:cNvPr id="3" name="Content Placeholder 2"/>
+              <p:cNvSpPr>
+                <a:spLocks noGrp="1"/>
+              </p:cNvSpPr>
+              <p:nvPr>
+                <p:ph idx="1"/>
+              </p:nvPr>
+            </p:nvSpPr>
+            <p:spPr/>
+            <p:txBody>
+              <a:bodyPr>
+                <a:normAutofit lnSpcReduction="10000"/>
+              </a:bodyPr>
+              <a:lstStyle/>
+              <a:p>
+                <a:r>
+                  <a:rPr lang="en-US" dirty="0"/>
+                  <a:t>We care about growth in effort given growth in input; i.e., what is the marginal cost to increase n to n+1?</a:t>
+                </a:r>
+              </a:p>
+              <a:p>
+                <a:r>
+                  <a:rPr lang="en-US" dirty="0"/>
+                  <a:t>The best picture comes from imagining </a:t>
+                </a:r>
+                <a:r>
+                  <a:rPr lang="en-US" i="1" dirty="0"/>
+                  <a:t>n</a:t>
+                </a:r>
+                <a:r>
+                  <a:rPr lang="en-US" dirty="0"/>
+                  <a:t> getting very big and the worst-case input scenario</a:t>
+                </a:r>
+              </a:p>
+              <a:p>
+                <a:r>
+                  <a:rPr lang="en-US" dirty="0"/>
+                  <a:t>This asymptotic behavior is called “big O” notation </a:t>
+                </a:r>
+                <a14:m>
+                  <m:oMath xmlns:m="http://schemas.openxmlformats.org/officeDocument/2006/math">
+                    <m:r>
+                      <a:rPr lang="en-US" i="1" dirty="0" smtClean="0">
+                        <a:latin typeface="Cambria Math" panose="02040503050406030204" pitchFamily="18" charset="0"/>
+                      </a:rPr>
+                      <m:t>𝑂</m:t>
+                    </m:r>
+                    <m:r>
+                      <a:rPr lang="en-US" i="1" dirty="0" smtClean="0">
+                        <a:latin typeface="Cambria Math" panose="02040503050406030204" pitchFamily="18" charset="0"/>
+                      </a:rPr>
+                      <m:t>(</m:t>
+                    </m:r>
+                    <m:r>
+                      <a:rPr lang="en-US" i="1" dirty="0" smtClean="0">
+                        <a:latin typeface="Cambria Math" panose="02040503050406030204" pitchFamily="18" charset="0"/>
+                      </a:rPr>
+                      <m:t>𝑛</m:t>
+                    </m:r>
+                    <m:r>
+                      <a:rPr lang="en-US" i="1" dirty="0" smtClean="0">
+                        <a:latin typeface="Cambria Math" panose="02040503050406030204" pitchFamily="18" charset="0"/>
+                      </a:rPr>
+                      <m:t>)</m:t>
+                    </m:r>
+                  </m:oMath>
+                </a14:m>
+                <a:endParaRPr lang="en-US" dirty="0"/>
+              </a:p>
+              <a:p>
+                <a:r>
+                  <a:rPr lang="en-US" dirty="0"/>
+                  <a:t>Therefore, ignore constants, keep only most important terms:</a:t>
+                </a:r>
+              </a:p>
+              <a:p>
+                <a:pPr lvl="1"/>
+                <a14:m>
+                  <m:oMath xmlns:m="http://schemas.openxmlformats.org/officeDocument/2006/math">
+                    <m:r>
+                      <a:rPr lang="en-US" i="1" dirty="0" smtClean="0">
+                        <a:latin typeface="Cambria Math" panose="02040503050406030204" pitchFamily="18" charset="0"/>
+                      </a:rPr>
+                      <m:t>𝑇</m:t>
+                    </m:r>
+                    <m:r>
+                      <a:rPr lang="en-US" i="1" dirty="0" smtClean="0">
+                        <a:latin typeface="Cambria Math" panose="02040503050406030204" pitchFamily="18" charset="0"/>
+                      </a:rPr>
+                      <m:t>(</m:t>
+                    </m:r>
+                    <m:r>
+                      <a:rPr lang="en-US" i="1" dirty="0" smtClean="0">
+                        <a:latin typeface="Cambria Math" panose="02040503050406030204" pitchFamily="18" charset="0"/>
+                      </a:rPr>
+                      <m:t>𝑛</m:t>
+                    </m:r>
+                    <m:r>
+                      <a:rPr lang="en-US" i="1" dirty="0" smtClean="0">
+                        <a:latin typeface="Cambria Math" panose="02040503050406030204" pitchFamily="18" charset="0"/>
+                      </a:rPr>
+                      <m:t>) = 2</m:t>
+                    </m:r>
+                    <m:r>
+                      <a:rPr lang="en-US" i="1" dirty="0" smtClean="0">
+                        <a:latin typeface="Cambria Math" panose="02040503050406030204" pitchFamily="18" charset="0"/>
+                      </a:rPr>
+                      <m:t>𝑛</m:t>
+                    </m:r>
+                  </m:oMath>
+                </a14:m>
+                <a:r>
+                  <a:rPr lang="en-US" dirty="0"/>
+                  <a:t> implies </a:t>
+                </a:r>
+                <a14:m>
+                  <m:oMath xmlns:m="http://schemas.openxmlformats.org/officeDocument/2006/math">
+                    <m:r>
+                      <a:rPr lang="en-US" i="1" dirty="0" smtClean="0">
+                        <a:latin typeface="Cambria Math" panose="02040503050406030204" pitchFamily="18" charset="0"/>
+                      </a:rPr>
+                      <m:t>𝑂</m:t>
+                    </m:r>
+                    <m:r>
+                      <a:rPr lang="en-US" i="1" dirty="0" smtClean="0">
+                        <a:latin typeface="Cambria Math" panose="02040503050406030204" pitchFamily="18" charset="0"/>
+                      </a:rPr>
+                      <m:t>(</m:t>
+                    </m:r>
+                    <m:r>
+                      <a:rPr lang="en-US" i="1" dirty="0" smtClean="0">
+                        <a:latin typeface="Cambria Math" panose="02040503050406030204" pitchFamily="18" charset="0"/>
+                      </a:rPr>
+                      <m:t>𝑛</m:t>
+                    </m:r>
+                    <m:r>
+                      <a:rPr lang="en-US" i="1" dirty="0" smtClean="0">
+                        <a:latin typeface="Cambria Math" panose="02040503050406030204" pitchFamily="18" charset="0"/>
+                      </a:rPr>
+                      <m:t>)</m:t>
+                    </m:r>
+                  </m:oMath>
+                </a14:m>
+                <a:endParaRPr lang="en-US" dirty="0"/>
+              </a:p>
+              <a:p>
+                <a:pPr lvl="1"/>
+                <a14:m>
+                  <m:oMath xmlns:m="http://schemas.openxmlformats.org/officeDocument/2006/math">
+                    <m:r>
+                      <a:rPr lang="en-US" i="1" dirty="0" smtClean="0">
+                        <a:latin typeface="Cambria Math" panose="02040503050406030204" pitchFamily="18" charset="0"/>
+                      </a:rPr>
+                      <m:t>𝑇</m:t>
+                    </m:r>
+                    <m:r>
+                      <a:rPr lang="en-US" i="1" dirty="0" smtClean="0">
+                        <a:latin typeface="Cambria Math" panose="02040503050406030204" pitchFamily="18" charset="0"/>
+                      </a:rPr>
+                      <m:t>(</m:t>
+                    </m:r>
+                    <m:r>
+                      <a:rPr lang="en-US" i="1" dirty="0" smtClean="0">
+                        <a:latin typeface="Cambria Math" panose="02040503050406030204" pitchFamily="18" charset="0"/>
+                      </a:rPr>
+                      <m:t>𝑛</m:t>
+                    </m:r>
+                    <m:r>
+                      <a:rPr lang="en-US" i="1" dirty="0" smtClean="0">
+                        <a:latin typeface="Cambria Math" panose="02040503050406030204" pitchFamily="18" charset="0"/>
+                      </a:rPr>
+                      <m:t>) = </m:t>
+                    </m:r>
+                    <m:sSup>
+                      <m:sSupPr>
+                        <m:ctrlPr>
+                          <a:rPr lang="en-US" b="0" i="1" dirty="0" smtClean="0">
+                            <a:latin typeface="Cambria Math" panose="02040503050406030204" pitchFamily="18" charset="0"/>
+                          </a:rPr>
+                        </m:ctrlPr>
+                      </m:sSupPr>
+                      <m:e>
+                        <m:r>
+                          <a:rPr lang="en-US" i="1" dirty="0" smtClean="0">
+                            <a:latin typeface="Cambria Math" panose="02040503050406030204" pitchFamily="18" charset="0"/>
+                          </a:rPr>
+                          <m:t>𝑛</m:t>
+                        </m:r>
+                      </m:e>
+                      <m:sup>
+                        <m:r>
+                          <a:rPr lang="en-US" b="0" i="1" dirty="0" smtClean="0">
+                            <a:latin typeface="Cambria Math" panose="02040503050406030204" pitchFamily="18" charset="0"/>
+                          </a:rPr>
+                          <m:t>3</m:t>
+                        </m:r>
+                      </m:sup>
+                    </m:sSup>
+                    <m:r>
+                      <a:rPr lang="en-US" i="1" dirty="0" smtClean="0">
+                        <a:latin typeface="Cambria Math" panose="02040503050406030204" pitchFamily="18" charset="0"/>
+                      </a:rPr>
+                      <m:t>+ </m:t>
+                    </m:r>
+                    <m:r>
+                      <a:rPr lang="en-US" i="1" dirty="0" smtClean="0">
+                        <a:latin typeface="Cambria Math" panose="02040503050406030204" pitchFamily="18" charset="0"/>
+                      </a:rPr>
+                      <m:t>𝑘</m:t>
+                    </m:r>
+                    <m:sSup>
+                      <m:sSupPr>
+                        <m:ctrlPr>
+                          <a:rPr lang="en-US" b="0" i="1" dirty="0" smtClean="0">
+                            <a:latin typeface="Cambria Math" panose="02040503050406030204" pitchFamily="18" charset="0"/>
+                          </a:rPr>
+                        </m:ctrlPr>
+                      </m:sSupPr>
+                      <m:e>
+                        <m:r>
+                          <a:rPr lang="en-US" i="1" dirty="0" smtClean="0">
+                            <a:latin typeface="Cambria Math" panose="02040503050406030204" pitchFamily="18" charset="0"/>
+                          </a:rPr>
+                          <m:t>𝑛</m:t>
+                        </m:r>
+                      </m:e>
+                      <m:sup>
+                        <m:r>
+                          <a:rPr lang="en-US" b="0" i="1" dirty="0" smtClean="0">
+                            <a:latin typeface="Cambria Math" panose="02040503050406030204" pitchFamily="18" charset="0"/>
+                          </a:rPr>
+                          <m:t>2</m:t>
+                        </m:r>
+                      </m:sup>
+                    </m:sSup>
+                    <m:r>
+                      <a:rPr lang="en-US" i="1" dirty="0" smtClean="0">
+                        <a:latin typeface="Cambria Math" panose="02040503050406030204" pitchFamily="18" charset="0"/>
+                      </a:rPr>
+                      <m:t>+ </m:t>
+                    </m:r>
+                    <m:r>
+                      <a:rPr lang="en-US" i="1" dirty="0" err="1">
+                        <a:latin typeface="Cambria Math" panose="02040503050406030204" pitchFamily="18" charset="0"/>
+                      </a:rPr>
+                      <m:t>𝑛𝑙𝑜𝑔𝑛</m:t>
+                    </m:r>
+                  </m:oMath>
+                </a14:m>
+                <a:r>
+                  <a:rPr lang="en-US" dirty="0"/>
+                  <a:t> implies </a:t>
+                </a:r>
+                <a14:m>
+                  <m:oMath xmlns:m="http://schemas.openxmlformats.org/officeDocument/2006/math">
+                    <m:r>
+                      <a:rPr lang="en-US" i="1" dirty="0" smtClean="0">
+                        <a:latin typeface="Cambria Math" panose="02040503050406030204" pitchFamily="18" charset="0"/>
+                      </a:rPr>
+                      <m:t>𝑂</m:t>
+                    </m:r>
+                    <m:r>
+                      <a:rPr lang="en-US" i="1" dirty="0" smtClean="0">
+                        <a:latin typeface="Cambria Math" panose="02040503050406030204" pitchFamily="18" charset="0"/>
+                      </a:rPr>
+                      <m:t>(</m:t>
+                    </m:r>
+                    <m:sSup>
+                      <m:sSupPr>
+                        <m:ctrlPr>
+                          <a:rPr lang="en-US" b="0" i="1" dirty="0" smtClean="0">
+                            <a:latin typeface="Cambria Math" panose="02040503050406030204" pitchFamily="18" charset="0"/>
+                          </a:rPr>
+                        </m:ctrlPr>
+                      </m:sSupPr>
+                      <m:e>
+                        <m:r>
+                          <a:rPr lang="en-US" i="1" dirty="0" smtClean="0">
+                            <a:latin typeface="Cambria Math" panose="02040503050406030204" pitchFamily="18" charset="0"/>
+                          </a:rPr>
+                          <m:t>𝑛</m:t>
+                        </m:r>
+                      </m:e>
+                      <m:sup>
+                        <m:r>
+                          <a:rPr lang="en-US" b="0" i="1" dirty="0" smtClean="0">
+                            <a:latin typeface="Cambria Math" panose="02040503050406030204" pitchFamily="18" charset="0"/>
+                          </a:rPr>
+                          <m:t>3</m:t>
+                        </m:r>
+                      </m:sup>
+                    </m:sSup>
+                    <m:r>
+                      <a:rPr lang="en-US" i="1" dirty="0" smtClean="0">
+                        <a:latin typeface="Cambria Math" panose="02040503050406030204" pitchFamily="18" charset="0"/>
+                      </a:rPr>
+                      <m:t>)</m:t>
+                    </m:r>
+                  </m:oMath>
+                </a14:m>
+                <a:endParaRPr lang="en-US" dirty="0"/>
+              </a:p>
+              <a:p>
+                <a:pPr lvl="1"/>
+                <a14:m>
+                  <m:oMath xmlns:m="http://schemas.openxmlformats.org/officeDocument/2006/math">
+                    <m:r>
+                      <a:rPr lang="en-US" i="1" dirty="0" smtClean="0">
+                        <a:latin typeface="Cambria Math" panose="02040503050406030204" pitchFamily="18" charset="0"/>
+                      </a:rPr>
+                      <m:t>𝑇</m:t>
+                    </m:r>
+                    <m:r>
+                      <a:rPr lang="en-US" i="1" dirty="0" smtClean="0">
+                        <a:latin typeface="Cambria Math" panose="02040503050406030204" pitchFamily="18" charset="0"/>
+                      </a:rPr>
+                      <m:t>(</m:t>
+                    </m:r>
+                    <m:r>
+                      <a:rPr lang="en-US" i="1" dirty="0" smtClean="0">
+                        <a:latin typeface="Cambria Math" panose="02040503050406030204" pitchFamily="18" charset="0"/>
+                      </a:rPr>
+                      <m:t>𝑛</m:t>
+                    </m:r>
+                    <m:r>
+                      <a:rPr lang="en-US" i="1" dirty="0" smtClean="0">
+                        <a:latin typeface="Cambria Math" panose="02040503050406030204" pitchFamily="18" charset="0"/>
+                      </a:rPr>
+                      <m:t>) = </m:t>
+                    </m:r>
+                    <m:r>
+                      <a:rPr lang="en-US" i="1" dirty="0" smtClean="0">
+                        <a:latin typeface="Cambria Math" panose="02040503050406030204" pitchFamily="18" charset="0"/>
+                      </a:rPr>
+                      <m:t>𝑘</m:t>
+                    </m:r>
+                    <m:r>
+                      <a:rPr lang="en-US" i="1" dirty="0" smtClean="0">
+                        <a:latin typeface="Cambria Math" panose="02040503050406030204" pitchFamily="18" charset="0"/>
+                      </a:rPr>
+                      <m:t> </m:t>
+                    </m:r>
+                  </m:oMath>
+                </a14:m>
+                <a:r>
+                  <a:rPr lang="en-US" dirty="0"/>
+                  <a:t>for constant k implies </a:t>
+                </a:r>
+                <a14:m>
+                  <m:oMath xmlns:m="http://schemas.openxmlformats.org/officeDocument/2006/math">
+                    <m:r>
+                      <a:rPr lang="en-US" i="1" dirty="0" smtClean="0">
+                        <a:latin typeface="Cambria Math" panose="02040503050406030204" pitchFamily="18" charset="0"/>
+                      </a:rPr>
+                      <m:t>𝑂</m:t>
+                    </m:r>
+                    <m:r>
+                      <a:rPr lang="en-US" i="1" dirty="0" smtClean="0">
+                        <a:latin typeface="Cambria Math" panose="02040503050406030204" pitchFamily="18" charset="0"/>
+                      </a:rPr>
+                      <m:t>(1)</m:t>
+                    </m:r>
+                  </m:oMath>
+                </a14:m>
+                <a:endParaRPr lang="en-US" dirty="0"/>
+              </a:p>
+              <a:p>
+                <a:r>
+                  <a:rPr lang="en-US" dirty="0"/>
+                  <a:t>E.g., </a:t>
+                </a:r>
+                <a14:m>
+                  <m:oMath xmlns:m="http://schemas.openxmlformats.org/officeDocument/2006/math">
+                    <m:r>
+                      <a:rPr lang="en-US" i="1" dirty="0" smtClean="0">
+                        <a:latin typeface="Cambria Math" panose="02040503050406030204" pitchFamily="18" charset="0"/>
+                      </a:rPr>
+                      <m:t>3</m:t>
+                    </m:r>
+                    <m:r>
+                      <a:rPr lang="en-US" i="1" dirty="0" smtClean="0">
+                        <a:latin typeface="Cambria Math" panose="02040503050406030204" pitchFamily="18" charset="0"/>
+                      </a:rPr>
+                      <m:t>𝑛</m:t>
+                    </m:r>
+                  </m:oMath>
+                </a14:m>
+                <a:r>
+                  <a:rPr lang="en-US" dirty="0"/>
+                  <a:t>! and </a:t>
+                </a:r>
+                <a14:m>
+                  <m:oMath xmlns:m="http://schemas.openxmlformats.org/officeDocument/2006/math">
+                    <m:r>
+                      <a:rPr lang="en-US" i="1" dirty="0" smtClean="0">
+                        <a:latin typeface="Cambria Math" panose="02040503050406030204" pitchFamily="18" charset="0"/>
+                      </a:rPr>
+                      <m:t>10</m:t>
+                    </m:r>
+                    <m:r>
+                      <a:rPr lang="en-US" i="1" dirty="0" smtClean="0">
+                        <a:latin typeface="Cambria Math" panose="02040503050406030204" pitchFamily="18" charset="0"/>
+                      </a:rPr>
+                      <m:t>𝑛</m:t>
+                    </m:r>
+                  </m:oMath>
+                </a14:m>
+                <a:r>
+                  <a:rPr lang="en-US" dirty="0"/>
+                  <a:t>! are indistinguishable asymptotically</a:t>
+                </a:r>
+              </a:p>
+              <a:p>
+                <a:endParaRPr lang="en-US" dirty="0"/>
+              </a:p>
+            </p:txBody>
+          </p:sp>
+        </mc:Choice>
+        <mc:Fallback xmlns="">
+          <p:sp>
+            <p:nvSpPr>
+              <p:cNvPr id="3" name="Content Placeholder 2"/>
+              <p:cNvSpPr>
+                <a:spLocks noGrp="1" noRot="1" noChangeAspect="1" noMove="1" noResize="1" noEditPoints="1" noAdjustHandles="1" noChangeArrowheads="1" noChangeShapeType="1" noTextEdit="1"/>
+              </p:cNvSpPr>
+              <p:nvPr>
+                <p:ph idx="1"/>
+              </p:nvPr>
+            </p:nvSpPr>
+            <p:spPr>
+              <a:blipFill>
+                <a:blip r:embed="rId2"/>
+                <a:stretch>
+                  <a:fillRect l="-1086" t="-3198" r="-2051"/>
+                </a:stretch>
+              </a:blipFill>
+            </p:spPr>
+            <p:txBody>
+              <a:bodyPr/>
+              <a:lstStyle/>
+              <a:p>
+                <a:r>
+                  <a:rPr lang="en-US">
+                    <a:noFill/>
+                  </a:rPr>
+                  <a:t> </a:t>
+                </a:r>
+              </a:p>
+            </p:txBody>
+          </p:sp>
+        </mc:Fallback>
+      </mc:AlternateContent>
     </p:spTree>
     <p:extLst>
       <p:ext uri="{BB962C8B-B14F-4D97-AF65-F5344CB8AC3E}">
@@ -4816,7 +5263,12 @@
             <p:ph type="title"/>
           </p:nvPr>
         </p:nvSpPr>
-        <p:spPr/>
+        <p:spPr>
+          <a:xfrm>
+            <a:off x="838200" y="365125"/>
+            <a:ext cx="10754710" cy="1325563"/>
+          </a:xfrm>
+        </p:spPr>
         <p:txBody>
           <a:bodyPr>
             <a:normAutofit/>
@@ -4824,8 +5276,8 @@
           <a:lstStyle/>
           <a:p>
             <a:r>
-              <a:rPr lang="en-US" dirty="0"/>
-              <a:t>What is the maximum amount of work?</a:t>
+              <a:rPr lang="en-US" sz="4000" dirty="0"/>
+              <a:t>Ask: What is the maximum amount of work?</a:t>
             </a:r>
           </a:p>
         </p:txBody>
@@ -5119,7 +5571,35 @@
               <a:p>
                 <a:r>
                   <a:rPr lang="en-US" dirty="0"/>
-                  <a:t>Loops nested k deep, going around n times, are often O(</a:t>
+                  <a:t>Loops nested </a:t>
+                </a:r>
+                <a14:m>
+                  <m:oMath xmlns:m="http://schemas.openxmlformats.org/officeDocument/2006/math">
+                    <m:r>
+                      <a:rPr lang="en-US" i="1" dirty="0" smtClean="0">
+                        <a:latin typeface="Cambria Math" panose="02040503050406030204" pitchFamily="18" charset="0"/>
+                      </a:rPr>
+                      <m:t>𝑘</m:t>
+                    </m:r>
+                  </m:oMath>
+                </a14:m>
+                <a:r>
+                  <a:rPr lang="en-US" dirty="0"/>
+                  <a:t> deep, going around </a:t>
+                </a:r>
+                <a14:m>
+                  <m:oMath xmlns:m="http://schemas.openxmlformats.org/officeDocument/2006/math">
+                    <m:r>
+                      <a:rPr lang="en-US" i="1" dirty="0" smtClean="0">
+                        <a:latin typeface="Cambria Math" panose="02040503050406030204" pitchFamily="18" charset="0"/>
+                      </a:rPr>
+                      <m:t>𝑛</m:t>
+                    </m:r>
+                  </m:oMath>
+                </a14:m>
+                <a:r>
+                  <a:rPr lang="en-US" dirty="0"/>
+                  <a:t> times, are often O(</a:t>
                 </a:r>
                 <a14:m>
                   <m:oMath xmlns:m="http://schemas.openxmlformats.org/officeDocument/2006/math">
@@ -5179,7 +5659,7 @@
               <a:blipFill>
                 <a:blip r:embed="rId2"/>
                 <a:stretch>
-                  <a:fillRect l="-965" t="-2632"/>
+                  <a:fillRect l="-1086" t="-2326"/>
                 </a:stretch>
               </a:blipFill>
             </p:spPr>
@@ -5368,41 +5848,103 @@
           </a:p>
         </p:txBody>
       </p:sp>
-      <p:sp>
-        <p:nvSpPr>
-          <p:cNvPr id="6" name="TextBox 5">
-            <a:extLst>
-              <a:ext uri="{FF2B5EF4-FFF2-40B4-BE49-F238E27FC236}">
-                <a16:creationId xmlns:a16="http://schemas.microsoft.com/office/drawing/2014/main" id="{56E65DA1-0732-854C-A56F-F8EF08AF75EB}"/>
-              </a:ext>
-            </a:extLst>
-          </p:cNvPr>
-          <p:cNvSpPr txBox="1"/>
-          <p:nvPr/>
-        </p:nvSpPr>
-        <p:spPr>
-          <a:xfrm>
-            <a:off x="1054336" y="3858442"/>
-            <a:ext cx="8953092" cy="461665"/>
-          </a:xfrm>
-          <a:prstGeom prst="rect">
-            <a:avLst/>
-          </a:prstGeom>
-          <a:noFill/>
-        </p:spPr>
-        <p:txBody>
-          <a:bodyPr wrap="none" rtlCol="0">
-            <a:spAutoFit/>
-          </a:bodyPr>
-          <a:lstStyle/>
-          <a:p>
-            <a:r>
-              <a:rPr lang="en-US" sz="2400" i="1" dirty="0"/>
-              <a:t>What is cost of these loops assuming “a=…” costs k operations?</a:t>
-            </a:r>
-          </a:p>
-        </p:txBody>
-      </p:sp>
+      <mc:AlternateContent xmlns:mc="http://schemas.openxmlformats.org/markup-compatibility/2006" xmlns:a14="http://schemas.microsoft.com/office/drawing/2010/main">
+        <mc:Choice Requires="a14">
+          <p:sp>
+            <p:nvSpPr>
+              <p:cNvPr id="6" name="TextBox 5">
+                <a:extLst>
+                  <a:ext uri="{FF2B5EF4-FFF2-40B4-BE49-F238E27FC236}">
+                    <a16:creationId xmlns:a16="http://schemas.microsoft.com/office/drawing/2014/main" id="{56E65DA1-0732-854C-A56F-F8EF08AF75EB}"/>
+                  </a:ext>
+                </a:extLst>
+              </p:cNvPr>
+              <p:cNvSpPr txBox="1"/>
+              <p:nvPr/>
+            </p:nvSpPr>
+            <p:spPr>
+              <a:xfrm>
+                <a:off x="1054336" y="3858442"/>
+                <a:ext cx="8953092" cy="461665"/>
+              </a:xfrm>
+              <a:prstGeom prst="rect">
+                <a:avLst/>
+              </a:prstGeom>
+              <a:noFill/>
+            </p:spPr>
+            <p:txBody>
+              <a:bodyPr wrap="none" rtlCol="0">
+                <a:spAutoFit/>
+              </a:bodyPr>
+              <a:lstStyle/>
+              <a:p>
+                <a:r>
+                  <a:rPr lang="en-US" sz="2400" i="1" dirty="0"/>
+                  <a:t>What is cost of these loops assuming “a=…” costs </a:t>
+                </a:r>
+                <a14:m>
+                  <m:oMath xmlns:m="http://schemas.openxmlformats.org/officeDocument/2006/math">
+                    <m:r>
+                      <a:rPr lang="en-US" sz="2400" i="1" dirty="0" smtClean="0">
+                        <a:latin typeface="Cambria Math" panose="02040503050406030204" pitchFamily="18" charset="0"/>
+                      </a:rPr>
+                      <m:t>𝑘</m:t>
+                    </m:r>
+                  </m:oMath>
+                </a14:m>
+                <a:r>
+                  <a:rPr lang="en-US" sz="2400" i="1" dirty="0"/>
+                  <a:t> operations?</a:t>
+                </a:r>
+              </a:p>
+            </p:txBody>
+          </p:sp>
+        </mc:Choice>
+        <mc:Fallback xmlns="">
+          <p:sp>
+            <p:nvSpPr>
+              <p:cNvPr id="6" name="TextBox 5">
+                <a:extLst>
+                  <a:ext uri="{FF2B5EF4-FFF2-40B4-BE49-F238E27FC236}">
+                    <a16:creationId xmlns:a16="http://schemas.microsoft.com/office/drawing/2014/main" id="{56E65DA1-0732-854C-A56F-F8EF08AF75EB}"/>
+                  </a:ext>
+                </a:extLst>
+              </p:cNvPr>
+              <p:cNvSpPr txBox="1">
+                <a:spLocks noRot="1" noChangeAspect="1" noMove="1" noResize="1" noEditPoints="1" noAdjustHandles="1" noChangeArrowheads="1" noChangeShapeType="1" noTextEdit="1"/>
+              </p:cNvSpPr>
+              <p:nvPr/>
+            </p:nvSpPr>
+            <p:spPr>
+              <a:xfrm>
+                <a:off x="1054336" y="3858442"/>
+                <a:ext cx="8953092" cy="461665"/>
+              </a:xfrm>
+              <a:prstGeom prst="rect">
+                <a:avLst/>
+              </a:prstGeom>
+              <a:blipFill>
+                <a:blip r:embed="rId3"/>
+                <a:stretch>
+                  <a:fillRect l="-1133" t="-7895" r="-283" b="-23684"/>
+                </a:stretch>
+              </a:blipFill>
+            </p:spPr>
+            <p:txBody>
+              <a:bodyPr/>
+              <a:lstStyle/>
+              <a:p>
+                <a:r>
+                  <a:rPr lang="en-US">
+                    <a:noFill/>
+                  </a:rPr>
+                  <a:t> </a:t>
+                </a:r>
+              </a:p>
+            </p:txBody>
+          </p:sp>
+        </mc:Fallback>
+      </mc:AlternateContent>
       <mc:AlternateContent xmlns:mc="http://schemas.openxmlformats.org/markup-compatibility/2006" xmlns:a14="http://schemas.microsoft.com/office/drawing/2010/main">
         <mc:Choice Requires="a14">
           <p:sp>
@@ -5609,8 +6151,56 @@
                 </a14:m>
                 <a:r>
                   <a:rPr lang="en-US" sz="2600" dirty="0"/>
-                  <a:t>, which is O(n^2)</a:t>
+                  <a:t>, which is </a:t>
                 </a:r>
+                <a14:m>
+                  <m:oMath xmlns:m="http://schemas.openxmlformats.org/officeDocument/2006/math">
+                    <m:r>
+                      <a:rPr lang="en-US" sz="2600" i="1" dirty="0" smtClean="0">
+                        <a:latin typeface="Cambria Math" panose="02040503050406030204" pitchFamily="18" charset="0"/>
+                      </a:rPr>
+                      <m:t>𝑂</m:t>
+                    </m:r>
+                    <m:r>
+                      <a:rPr lang="en-US" sz="2600" i="1" dirty="0" smtClean="0">
+                        <a:latin typeface="Cambria Math" panose="02040503050406030204" pitchFamily="18" charset="0"/>
+                      </a:rPr>
+                      <m:t>(</m:t>
+                    </m:r>
+                    <m:sSup>
+                      <m:sSupPr>
+                        <m:ctrlPr>
+                          <a:rPr lang="en-US" sz="2600" i="1" dirty="0" smtClean="0">
+                            <a:latin typeface="Cambria Math" panose="02040503050406030204" pitchFamily="18" charset="0"/>
+                          </a:rPr>
+                        </m:ctrlPr>
+                      </m:sSupPr>
+                      <m:e>
+                        <m:r>
+                          <a:rPr lang="en-US" sz="2600" i="1" dirty="0" smtClean="0">
+                            <a:latin typeface="Cambria Math" panose="02040503050406030204" pitchFamily="18" charset="0"/>
+                          </a:rPr>
+                          <m:t>𝑛</m:t>
+                        </m:r>
+                      </m:e>
+                      <m:sup>
+                        <m:r>
+                          <a:rPr lang="en-US" sz="2600" b="0" i="1" dirty="0" smtClean="0">
+                            <a:latin typeface="Cambria Math" panose="02040503050406030204" pitchFamily="18" charset="0"/>
+                          </a:rPr>
+                          <m:t>2</m:t>
+                        </m:r>
+                      </m:sup>
+                    </m:sSup>
+                    <m:r>
+                      <a:rPr lang="en-US" sz="2600" i="1" dirty="0" smtClean="0">
+                        <a:latin typeface="Cambria Math" panose="02040503050406030204" pitchFamily="18" charset="0"/>
+                      </a:rPr>
+                      <m:t>)</m:t>
+                    </m:r>
+                  </m:oMath>
+                </a14:m>
+                <a:endParaRPr lang="en-US" sz="2600" dirty="0"/>
               </a:p>
             </p:txBody>
           </p:sp>
@@ -5639,9 +6229,9 @@
                 <a:avLst/>
               </a:prstGeom>
               <a:blipFill>
-                <a:blip r:embed="rId3"/>
+                <a:blip r:embed="rId4"/>
                 <a:stretch>
-                  <a:fillRect l="-1305" t="-113636" r="-326" b="-170455"/>
+                  <a:fillRect l="-1468" t="-115909" b="-170455"/>
                 </a:stretch>
               </a:blipFill>
             </p:spPr>
@@ -6842,20 +7432,12 @@
           <a:lstStyle/>
           <a:p>
             <a:r>
-              <a:rPr lang="en-US" sz="2400" dirty="0" err="1">
-                <a:latin typeface="Monaco" charset="0"/>
-                <a:ea typeface="Monaco" charset="0"/>
-                <a:cs typeface="Monaco" charset="0"/>
-              </a:rPr>
-              <a:t>def</a:t>
-            </a:r>
-            <a:r>
               <a:rPr lang="en-US" sz="2400" dirty="0">
                 <a:latin typeface="Monaco" charset="0"/>
                 <a:ea typeface="Monaco" charset="0"/>
                 <a:cs typeface="Monaco" charset="0"/>
               </a:rPr>
-              <a:t> </a:t>
+              <a:t>def </a:t>
             </a:r>
             <a:r>
               <a:rPr lang="en-US" sz="2400" dirty="0" err="1">
@@ -6871,7 +7453,7 @@
                 <a:ea typeface="Monaco" charset="0"/>
                 <a:cs typeface="Monaco" charset="0"/>
               </a:rPr>
-              <a:t>(words, a):</a:t>
+              <a:t>(words, doc):</a:t>
             </a:r>
           </a:p>
           <a:p>
@@ -6949,7 +7531,7 @@
                 <a:ea typeface="Monaco" charset="0"/>
                 <a:cs typeface="Monaco" charset="0"/>
               </a:rPr>
-              <a:t>] in a:</a:t>
+              <a:t>] in doc:</a:t>
             </a:r>
           </a:p>
           <a:p>
@@ -7504,20 +8086,12 @@
           <a:lstStyle/>
           <a:p>
             <a:r>
-              <a:rPr lang="en-US" sz="2400" dirty="0" err="1">
-                <a:latin typeface="Monaco" charset="0"/>
-                <a:ea typeface="Monaco" charset="0"/>
-                <a:cs typeface="Monaco" charset="0"/>
-              </a:rPr>
-              <a:t>def</a:t>
-            </a:r>
-            <a:r>
               <a:rPr lang="en-US" sz="2400" dirty="0">
                 <a:latin typeface="Monaco" charset="0"/>
                 <a:ea typeface="Monaco" charset="0"/>
                 <a:cs typeface="Monaco" charset="0"/>
               </a:rPr>
-              <a:t> </a:t>
+              <a:t>def </a:t>
             </a:r>
             <a:r>
               <a:rPr lang="en-US" sz="2400" dirty="0" err="1">
@@ -7557,7 +8131,7 @@
                 <a:ea typeface="Monaco" charset="0"/>
                 <a:cs typeface="Monaco" charset="0"/>
               </a:rPr>
-              <a:t>a:</a:t>
+              <a:t>doc:</a:t>
             </a:r>
             <a:r>
               <a:rPr lang="en-US" sz="2400" b="1" dirty="0" err="1">
@@ -7654,7 +8228,7 @@
                 <a:ea typeface="Monaco" charset="0"/>
                 <a:cs typeface="Monaco" charset="0"/>
               </a:rPr>
-              <a:t>] in a:</a:t>
+              <a:t>] in doc:</a:t>
             </a:r>
           </a:p>
           <a:p>
@@ -7764,8 +8338,8 @@
           </a:p>
         </p:txBody>
       </p:sp>
-      <mc:AlternateContent xmlns:mc="http://schemas.openxmlformats.org/markup-compatibility/2006" xmlns:a14="http://schemas.microsoft.com/office/drawing/2010/main">
-        <mc:Choice Requires="a14">
+      <mc:AlternateContent xmlns:mc="http://schemas.openxmlformats.org/markup-compatibility/2006">
+        <mc:Choice xmlns:a14="http://schemas.microsoft.com/office/drawing/2010/main" Requires="a14">
           <p:sp>
             <p:nvSpPr>
               <p:cNvPr id="3" name="Content Placeholder 2"/>
@@ -7957,16 +8531,12 @@
                   <a:t>What is </a:t>
                 </a:r>
                 <a:r>
-                  <a:rPr lang="en-US" i="1"/>
+                  <a:rPr lang="en-US" i="1" dirty="0"/>
                   <a:t>O()</a:t>
                 </a:r>
                 <a:r>
-                  <a:rPr lang="en-US"/>
-                  <a:t> </a:t>
-                </a:r>
-                <a:r>
                   <a:rPr lang="en-US" dirty="0"/>
-                  <a:t>for </a:t>
+                  <a:t> for </a:t>
                 </a:r>
                 <a:r>
                   <a:rPr lang="en-US" dirty="0" err="1"/>
@@ -8352,7 +8922,21 @@
                 </a:r>
                 <a:r>
                   <a:rPr lang="en-US" i="1" dirty="0"/>
-                  <a:t>O(nm) </a:t>
+                  <a:t>O(</a:t>
+                </a:r>
+                <a14:m>
+                  <m:oMath xmlns:m="http://schemas.openxmlformats.org/officeDocument/2006/math">
+                    <m:r>
+                      <a:rPr lang="en-US" i="1" dirty="0" smtClean="0">
+                        <a:latin typeface="Cambria Math" panose="02040503050406030204" pitchFamily="18" charset="0"/>
+                      </a:rPr>
+                      <m:t>𝑛𝑚</m:t>
+                    </m:r>
+                  </m:oMath>
+                </a14:m>
+                <a:r>
+                  <a:rPr lang="en-US" i="1" dirty="0"/>
+                  <a:t>) </a:t>
                 </a:r>
                 <a:r>
                   <a:rPr lang="en-US" dirty="0"/>
@@ -8399,7 +8983,7 @@
             </p:txBody>
           </p:sp>
         </mc:Choice>
-        <mc:Fallback xmlns="">
+        <mc:Fallback>
           <p:sp>
             <p:nvSpPr>
               <p:cNvPr id="3" name="Content Placeholder 2"/>
@@ -8419,7 +9003,7 @@
               <a:blipFill>
                 <a:blip r:embed="rId2"/>
                 <a:stretch>
-                  <a:fillRect l="-797" t="-3216" b="-4094"/>
+                  <a:fillRect l="-912" t="-2907" b="-4070"/>
                 </a:stretch>
               </a:blipFill>
             </p:spPr>
@@ -8466,20 +9050,12 @@
           <a:lstStyle/>
           <a:p>
             <a:r>
-              <a:rPr lang="en-US" sz="2400" dirty="0" err="1">
-                <a:latin typeface="Monaco" charset="0"/>
-                <a:ea typeface="Monaco" charset="0"/>
-                <a:cs typeface="Monaco" charset="0"/>
-              </a:rPr>
-              <a:t>def</a:t>
-            </a:r>
-            <a:r>
               <a:rPr lang="en-US" sz="2400" dirty="0">
                 <a:latin typeface="Monaco" charset="0"/>
                 <a:ea typeface="Monaco" charset="0"/>
                 <a:cs typeface="Monaco" charset="0"/>
               </a:rPr>
-              <a:t> </a:t>
+              <a:t>def </a:t>
             </a:r>
             <a:r>
               <a:rPr lang="en-US" sz="2400" dirty="0" err="1">
@@ -8519,7 +9095,7 @@
                 <a:ea typeface="Monaco" charset="0"/>
                 <a:cs typeface="Monaco" charset="0"/>
               </a:rPr>
-              <a:t>a:</a:t>
+              <a:t>doc:</a:t>
             </a:r>
             <a:r>
               <a:rPr lang="en-US" sz="2400" b="1" dirty="0" err="1">
@@ -8616,7 +9192,7 @@
                 <a:ea typeface="Monaco" charset="0"/>
                 <a:cs typeface="Monaco" charset="0"/>
               </a:rPr>
-              <a:t>] in a:</a:t>
+              <a:t>] in doc:</a:t>
             </a:r>
           </a:p>
           <a:p>
@@ -8720,7 +9296,7 @@
               <a:p>
                 <a:r>
                   <a:rPr lang="en-US" dirty="0"/>
-                  <a:t>Get a feel for algorithm time and space performance operating on a specific data structure or structures</a:t>
+                  <a:t>Get a feel for algorithm time and space performance to operate on a specific data structure or structures</a:t>
                 </a:r>
               </a:p>
               <a:p>
@@ -8813,7 +9389,7 @@
               <a:blipFill>
                 <a:blip r:embed="rId2"/>
                 <a:stretch>
-                  <a:fillRect l="-965" t="-2632"/>
+                  <a:fillRect l="-1086" t="-2326" r="-603"/>
                 </a:stretch>
               </a:blipFill>
             </p:spPr>
@@ -12134,8 +12710,8 @@
           </a:p>
         </p:txBody>
       </p:sp>
-      <mc:AlternateContent xmlns:mc="http://schemas.openxmlformats.org/markup-compatibility/2006" xmlns:a14="http://schemas.microsoft.com/office/drawing/2010/main">
-        <mc:Choice Requires="a14">
+      <mc:AlternateContent xmlns:mc="http://schemas.openxmlformats.org/markup-compatibility/2006">
+        <mc:Choice xmlns:a14="http://schemas.microsoft.com/office/drawing/2010/main" Requires="a14">
           <p:sp>
             <p:nvSpPr>
               <p:cNvPr id="3" name="Content Placeholder 2"/>
@@ -12158,7 +12734,15 @@
               <a:p>
                 <a:r>
                   <a:rPr lang="en-US" dirty="0"/>
-                  <a:t>Let n be the input size</a:t>
+                  <a:t>Let </a:t>
+                </a:r>
+                <a:r>
+                  <a:rPr lang="en-US" i="1" dirty="0"/>
+                  <a:t>n</a:t>
+                </a:r>
+                <a:r>
+                  <a:rPr lang="en-US" dirty="0"/>
+                  <a:t> be the input size</a:t>
                 </a:r>
               </a:p>
               <a:p>
@@ -12283,7 +12867,7 @@
             </p:txBody>
           </p:sp>
         </mc:Choice>
-        <mc:Fallback xmlns="">
+        <mc:Fallback>
           <p:sp>
             <p:nvSpPr>
               <p:cNvPr id="3" name="Content Placeholder 2"/>
@@ -12302,7 +12886,7 @@
               <a:blipFill>
                 <a:blip r:embed="rId3"/>
                 <a:stretch>
-                  <a:fillRect l="-932" t="-2632"/>
+                  <a:fillRect l="-1049" t="-2326"/>
                 </a:stretch>
               </a:blipFill>
             </p:spPr>
@@ -14494,14 +15078,14 @@
                 <p:ph idx="1"/>
                 <p:extLst>
                   <p:ext uri="{D42A27DB-BD31-4B8C-83A1-F6EECF244321}">
-                    <p14:modId xmlns:p14="http://schemas.microsoft.com/office/powerpoint/2010/main" val="294689039"/>
+                    <p14:modId xmlns:p14="http://schemas.microsoft.com/office/powerpoint/2010/main" val="2403264393"/>
                   </p:ext>
                 </p:extLst>
               </p:nvPr>
             </p:nvGraphicFramePr>
             <p:xfrm>
-              <a:off x="164386" y="947718"/>
-              <a:ext cx="11846104" cy="5487219"/>
+              <a:off x="132856" y="947718"/>
+              <a:ext cx="12027613" cy="5487219"/>
             </p:xfrm>
             <a:graphic>
               <a:graphicData uri="http://schemas.openxmlformats.org/drawingml/2006/table">
@@ -14510,28 +15094,28 @@
                     <a:tableStyleId>{073A0DAA-6AF3-43AB-8588-CEC1D06C72B9}</a:tableStyleId>
                   </a:tblPr>
                   <a:tblGrid>
-                    <a:gridCol w="2135928">
+                    <a:gridCol w="2168655">
                       <a:extLst>
                         <a:ext uri="{9D8B030D-6E8A-4147-A177-3AD203B41FA5}">
                           <a16:colId xmlns:a16="http://schemas.microsoft.com/office/drawing/2014/main" val="20000"/>
                         </a:ext>
                       </a:extLst>
                     </a:gridCol>
-                    <a:gridCol w="4203228">
+                    <a:gridCol w="4267631">
                       <a:extLst>
                         <a:ext uri="{9D8B030D-6E8A-4147-A177-3AD203B41FA5}">
                           <a16:colId xmlns:a16="http://schemas.microsoft.com/office/drawing/2014/main" val="20001"/>
                         </a:ext>
                       </a:extLst>
                     </a:gridCol>
-                    <a:gridCol w="1479478">
+                    <a:gridCol w="1502147">
                       <a:extLst>
                         <a:ext uri="{9D8B030D-6E8A-4147-A177-3AD203B41FA5}">
                           <a16:colId xmlns:a16="http://schemas.microsoft.com/office/drawing/2014/main" val="20002"/>
                         </a:ext>
                       </a:extLst>
                     </a:gridCol>
-                    <a:gridCol w="4027470">
+                    <a:gridCol w="4089180">
                       <a:extLst>
                         <a:ext uri="{9D8B030D-6E8A-4147-A177-3AD203B41FA5}">
                           <a16:colId xmlns:a16="http://schemas.microsoft.com/office/drawing/2014/main" val="20003"/>
@@ -16390,7 +16974,7 @@
                           </a:r>
                           <a:r>
                             <a:rPr lang="en-US" sz="2000" baseline="0" dirty="0"/>
-                            <a:t> of work in half each iteration, but process both halves, the combine results in linear time</a:t>
+                            <a:t> of work in half each iteration, but process both halves, then combine results in linear time</a:t>
                           </a:r>
                           <a:endParaRPr lang="en-US" sz="2000" dirty="0"/>
                         </a:p>
@@ -16465,14 +17049,14 @@
                 <p:ph idx="1"/>
                 <p:extLst>
                   <p:ext uri="{D42A27DB-BD31-4B8C-83A1-F6EECF244321}">
-                    <p14:modId xmlns:p14="http://schemas.microsoft.com/office/powerpoint/2010/main" val="294689039"/>
+                    <p14:modId xmlns:p14="http://schemas.microsoft.com/office/powerpoint/2010/main" val="2403264393"/>
                   </p:ext>
                 </p:extLst>
               </p:nvPr>
             </p:nvGraphicFramePr>
             <p:xfrm>
-              <a:off x="164386" y="947718"/>
-              <a:ext cx="11846104" cy="5487219"/>
+              <a:off x="132856" y="947718"/>
+              <a:ext cx="12027613" cy="5487219"/>
             </p:xfrm>
             <a:graphic>
               <a:graphicData uri="http://schemas.openxmlformats.org/drawingml/2006/table">
@@ -16481,28 +17065,28 @@
                     <a:tableStyleId>{073A0DAA-6AF3-43AB-8588-CEC1D06C72B9}</a:tableStyleId>
                   </a:tblPr>
                   <a:tblGrid>
-                    <a:gridCol w="2135928">
+                    <a:gridCol w="2168655">
                       <a:extLst>
                         <a:ext uri="{9D8B030D-6E8A-4147-A177-3AD203B41FA5}">
                           <a16:colId xmlns:a16="http://schemas.microsoft.com/office/drawing/2014/main" val="20000"/>
                         </a:ext>
                       </a:extLst>
                     </a:gridCol>
-                    <a:gridCol w="4203228">
+                    <a:gridCol w="4267631">
                       <a:extLst>
                         <a:ext uri="{9D8B030D-6E8A-4147-A177-3AD203B41FA5}">
                           <a16:colId xmlns:a16="http://schemas.microsoft.com/office/drawing/2014/main" val="20001"/>
                         </a:ext>
                       </a:extLst>
                     </a:gridCol>
-                    <a:gridCol w="1479478">
+                    <a:gridCol w="1502147">
                       <a:extLst>
                         <a:ext uri="{9D8B030D-6E8A-4147-A177-3AD203B41FA5}">
                           <a16:colId xmlns:a16="http://schemas.microsoft.com/office/drawing/2014/main" val="20002"/>
                         </a:ext>
                       </a:extLst>
                     </a:gridCol>
-                    <a:gridCol w="4027470">
+                    <a:gridCol w="4089180">
                       <a:extLst>
                         <a:ext uri="{9D8B030D-6E8A-4147-A177-3AD203B41FA5}">
                           <a16:colId xmlns:a16="http://schemas.microsoft.com/office/drawing/2014/main" val="20003"/>
@@ -17173,9 +17757,9 @@
                           <a:prstDash val="solid"/>
                         </a:lnBlToTr>
                         <a:blipFill>
-                          <a:blip r:embed="rId2"/>
+                          <a:blip r:embed="rId3"/>
                           <a:stretch>
-                            <a:fillRect l="-50602" t="-62136" r="-131024" b="-314563"/>
+                            <a:fillRect l="-51190" t="-62136" r="-131548" b="-315534"/>
                           </a:stretch>
                         </a:blipFill>
                       </a:tcPr>
@@ -17234,9 +17818,9 @@
                           <a:prstDash val="solid"/>
                         </a:lnBlToTr>
                         <a:blipFill>
-                          <a:blip r:embed="rId2"/>
+                          <a:blip r:embed="rId3"/>
                           <a:stretch>
-                            <a:fillRect l="-431034" t="-62136" r="-275000" b="-314563"/>
+                            <a:fillRect l="-426891" t="-62136" r="-271429" b="-315534"/>
                           </a:stretch>
                         </a:blipFill>
                       </a:tcPr>
@@ -18026,9 +18610,9 @@
                           <a:prstDash val="solid"/>
                         </a:lnBlToTr>
                         <a:blipFill>
-                          <a:blip r:embed="rId2"/>
+                          <a:blip r:embed="rId3"/>
                           <a:stretch>
-                            <a:fillRect l="-50602" t="-299083" r="-131024" b="-51376"/>
+                            <a:fillRect l="-51190" t="-299083" r="-131548" b="-52294"/>
                           </a:stretch>
                         </a:blipFill>
                       </a:tcPr>
@@ -18119,7 +18703,7 @@
                           </a:r>
                           <a:r>
                             <a:rPr lang="en-US" sz="2000" baseline="0" dirty="0"/>
-                            <a:t> of work in half each iteration, but process both halves, the combine results in linear time</a:t>
+                            <a:t> of work in half each iteration, but process both halves, then combine results in linear time</a:t>
                           </a:r>
                           <a:endParaRPr lang="en-US" sz="2000" dirty="0"/>
                         </a:p>
@@ -18222,8 +18806,8 @@
           <a:chExt cx="0" cy="0"/>
         </a:xfrm>
       </p:grpSpPr>
-      <mc:AlternateContent xmlns:mc="http://schemas.openxmlformats.org/markup-compatibility/2006">
-        <mc:Choice xmlns:a14="http://schemas.microsoft.com/office/drawing/2010/main" Requires="a14">
+      <mc:AlternateContent xmlns:mc="http://schemas.openxmlformats.org/markup-compatibility/2006" xmlns:a14="http://schemas.microsoft.com/office/drawing/2010/main">
+        <mc:Choice Requires="a14">
           <p:graphicFrame>
             <p:nvGraphicFramePr>
               <p:cNvPr id="4" name="Content Placeholder 3"/>
@@ -19571,7 +20155,7 @@
             </a:graphic>
           </p:graphicFrame>
         </mc:Choice>
-        <mc:Fallback>
+        <mc:Fallback xmlns="">
           <p:graphicFrame>
             <p:nvGraphicFramePr>
               <p:cNvPr id="4" name="Content Placeholder 3"/>
@@ -22955,14 +23539,22 @@
           <a:lstStyle/>
           <a:p>
             <a:r>
+              <a:rPr lang="en-US" b="1" dirty="0"/>
+              <a:t>Space complexity </a:t>
+            </a:r>
+            <a:r>
               <a:rPr lang="en-US" dirty="0"/>
-              <a:t>Space complexity measures the amount of storage necessary to execute an algorithm as a function of input size</a:t>
-            </a:r>
-          </a:p>
-          <a:p>
+              <a:t>measures the amount of storage necessary to execute an algorithm as a function of input size</a:t>
+            </a:r>
+          </a:p>
+          <a:p>
+            <a:r>
+              <a:rPr lang="en-US" b="1" dirty="0"/>
+              <a:t>Time complexity </a:t>
+            </a:r>
             <a:r>
               <a:rPr lang="en-US" dirty="0"/>
-              <a:t>Time complexity measures the amount of time necessary to execute an algorithm as a function of input size</a:t>
+              <a:t>measures the amount of work ("time") necessary to execute an algorithm as a function of input size</a:t>
             </a:r>
           </a:p>
           <a:p>
@@ -23192,7 +23784,7 @@
               <a:p>
                 <a:r>
                   <a:rPr lang="en-US" dirty="0"/>
-                  <a:t>Charge 2 operations to a single element for each iteration </a:t>
+                  <a:t>Charge 2 operations to a single input element for each iteration </a:t>
                 </a:r>
                 <a:br>
                   <a:rPr lang="en-US" dirty="0"/>
@@ -23295,7 +23887,7 @@
               <a:blipFill>
                 <a:blip r:embed="rId2"/>
                 <a:stretch>
-                  <a:fillRect l="-965" t="-2632"/>
+                  <a:fillRect l="-1086" t="-2326" r="-603"/>
                 </a:stretch>
               </a:blipFill>
             </p:spPr>
@@ -23452,7 +24044,7 @@
           <a:prstGeom prst="straightConnector1">
             <a:avLst/>
           </a:prstGeom>
-          <a:ln>
+          <a:ln w="12700">
             <a:tailEnd type="triangle"/>
           </a:ln>
         </p:spPr>
@@ -23493,7 +24085,7 @@
           <a:prstGeom prst="straightConnector1">
             <a:avLst/>
           </a:prstGeom>
-          <a:ln>
+          <a:ln w="12700">
             <a:tailEnd type="triangle"/>
           </a:ln>
         </p:spPr>
@@ -23585,7 +24177,7 @@
         </p:nvSpPr>
         <p:spPr>
           <a:xfrm>
-            <a:off x="359228" y="6444343"/>
+            <a:off x="0" y="6550223"/>
             <a:ext cx="7053943" cy="307777"/>
           </a:xfrm>
           <a:prstGeom prst="rect">
@@ -23607,18 +24199,7 @@
                 <a:ea typeface="Arial" charset="0"/>
                 <a:cs typeface="Arial" charset="0"/>
               </a:rPr>
-              <a:t>From http://</a:t>
-            </a:r>
-            <a:r>
-              <a:rPr lang="en-US" sz="1400" dirty="0" err="1">
-                <a:solidFill>
-                  <a:srgbClr val="657B83"/>
-                </a:solidFill>
-                <a:latin typeface="Arial" charset="0"/>
-                <a:ea typeface="Arial" charset="0"/>
-                <a:cs typeface="Arial" charset="0"/>
-              </a:rPr>
-              <a:t>cooervo.github.io</a:t>
+              <a:t>From </a:t>
             </a:r>
             <a:r>
               <a:rPr lang="en-US" sz="1400" dirty="0">
@@ -23628,74 +24209,9 @@
                 <a:latin typeface="Arial" charset="0"/>
                 <a:ea typeface="Arial" charset="0"/>
                 <a:cs typeface="Arial" charset="0"/>
+                <a:hlinkClick r:id="rId3"/>
               </a:rPr>
-              <a:t>/Algorithms-</a:t>
-            </a:r>
-            <a:r>
-              <a:rPr lang="en-US" sz="1400" dirty="0" err="1">
-                <a:solidFill>
-                  <a:srgbClr val="657B83"/>
-                </a:solidFill>
-                <a:latin typeface="Arial" charset="0"/>
-                <a:ea typeface="Arial" charset="0"/>
-                <a:cs typeface="Arial" charset="0"/>
-              </a:rPr>
-              <a:t>DataStructures</a:t>
-            </a:r>
-            <a:r>
-              <a:rPr lang="en-US" sz="1400" dirty="0">
-                <a:solidFill>
-                  <a:srgbClr val="657B83"/>
-                </a:solidFill>
-                <a:latin typeface="Arial" charset="0"/>
-                <a:ea typeface="Arial" charset="0"/>
-                <a:cs typeface="Arial" charset="0"/>
-              </a:rPr>
-              <a:t>-</a:t>
-            </a:r>
-            <a:r>
-              <a:rPr lang="en-US" sz="1400" dirty="0" err="1">
-                <a:solidFill>
-                  <a:srgbClr val="657B83"/>
-                </a:solidFill>
-                <a:latin typeface="Arial" charset="0"/>
-                <a:ea typeface="Arial" charset="0"/>
-                <a:cs typeface="Arial" charset="0"/>
-              </a:rPr>
-              <a:t>BigONotation</a:t>
-            </a:r>
-            <a:r>
-              <a:rPr lang="en-US" sz="1400" dirty="0">
-                <a:solidFill>
-                  <a:srgbClr val="657B83"/>
-                </a:solidFill>
-                <a:latin typeface="Arial" charset="0"/>
-                <a:ea typeface="Arial" charset="0"/>
-                <a:cs typeface="Arial" charset="0"/>
-              </a:rPr>
-              <a:t>/</a:t>
-            </a:r>
-            <a:r>
-              <a:rPr lang="en-US" sz="1400" dirty="0" err="1">
-                <a:solidFill>
-                  <a:srgbClr val="657B83"/>
-                </a:solidFill>
-                <a:latin typeface="Arial" charset="0"/>
-                <a:ea typeface="Arial" charset="0"/>
-                <a:cs typeface="Arial" charset="0"/>
-              </a:rPr>
-              <a:t>index.html</a:t>
-            </a:r>
-            <a:r>
-              <a:rPr lang="en-US" sz="1400" dirty="0">
-                <a:solidFill>
-                  <a:srgbClr val="657B83"/>
-                </a:solidFill>
-                <a:latin typeface="Arial" charset="0"/>
-                <a:ea typeface="Arial" charset="0"/>
-                <a:cs typeface="Arial" charset="0"/>
-              </a:rPr>
-              <a:t>:</a:t>
+              <a:t>http://cooervo.github.io/Algorithms-DataStructures-BigONotation/index.html</a:t>
             </a:r>
             <a:endParaRPr lang="en-US" sz="1400" dirty="0">
               <a:latin typeface="Arial" charset="0"/>
@@ -23722,7 +24238,7 @@
           </p:nvPr>
         </p:nvPicPr>
         <p:blipFill>
-          <a:blip r:embed="rId3"/>
+          <a:blip r:embed="rId4"/>
           <a:stretch>
             <a:fillRect/>
           </a:stretch>
@@ -23734,6 +24250,38 @@
           </a:xfrm>
         </p:spPr>
       </p:pic>
+      <p:sp>
+        <p:nvSpPr>
+          <p:cNvPr id="7" name="TextBox 6">
+            <a:extLst>
+              <a:ext uri="{FF2B5EF4-FFF2-40B4-BE49-F238E27FC236}">
+                <a16:creationId xmlns:a16="http://schemas.microsoft.com/office/drawing/2014/main" id="{C2D4948E-D220-DC45-B033-D717191469C2}"/>
+              </a:ext>
+            </a:extLst>
+          </p:cNvPr>
+          <p:cNvSpPr txBox="1"/>
+          <p:nvPr/>
+        </p:nvSpPr>
+        <p:spPr>
+          <a:xfrm>
+            <a:off x="4750676" y="6334779"/>
+            <a:ext cx="184731" cy="369332"/>
+          </a:xfrm>
+          <a:prstGeom prst="rect">
+            <a:avLst/>
+          </a:prstGeom>
+          <a:noFill/>
+        </p:spPr>
+        <p:txBody>
+          <a:bodyPr wrap="none" rtlCol="0">
+            <a:spAutoFit/>
+          </a:bodyPr>
+          <a:lstStyle/>
+          <a:p>
+            <a:endParaRPr lang="en-US" dirty="0"/>
+          </a:p>
+        </p:txBody>
+      </p:sp>
     </p:spTree>
     <p:extLst>
       <p:ext uri="{BB962C8B-B14F-4D97-AF65-F5344CB8AC3E}">
@@ -23836,7 +24384,7 @@
         </p:nvSpPr>
         <p:spPr>
           <a:xfrm>
-            <a:off x="217715" y="6418497"/>
+            <a:off x="-26434" y="6579516"/>
             <a:ext cx="6096000" cy="276999"/>
           </a:xfrm>
           <a:prstGeom prst="rect">
@@ -23858,18 +24406,7 @@
                 <a:ea typeface="Arial" charset="0"/>
                 <a:cs typeface="Arial" charset="0"/>
               </a:rPr>
-              <a:t>From https://</a:t>
-            </a:r>
-            <a:r>
-              <a:rPr lang="en-US" sz="1200" dirty="0" err="1">
-                <a:solidFill>
-                  <a:srgbClr val="657B83"/>
-                </a:solidFill>
-                <a:latin typeface="Arial" charset="0"/>
-                <a:ea typeface="Arial" charset="0"/>
-                <a:cs typeface="Arial" charset="0"/>
-              </a:rPr>
-              <a:t>medium.freecodecamp.org</a:t>
+              <a:t>Plot from </a:t>
             </a:r>
             <a:r>
               <a:rPr lang="en-US" sz="1200" dirty="0">
@@ -23879,8 +24416,9 @@
                 <a:latin typeface="Arial" charset="0"/>
                 <a:ea typeface="Arial" charset="0"/>
                 <a:cs typeface="Arial" charset="0"/>
+                <a:hlinkClick r:id="rId3"/>
               </a:rPr>
-              <a:t>/my-first-foray-into-technology-c5b6e83fe8f1</a:t>
+              <a:t>https://medium.freecodecamp.org/my-first-foray-into-technology-c5b6e83fe8f1</a:t>
             </a:r>
             <a:endParaRPr lang="en-US" sz="1200" dirty="0">
               <a:latin typeface="Arial" charset="0"/>
@@ -24001,7 +24539,7 @@
           <p:nvPr/>
         </p:nvPicPr>
         <p:blipFill>
-          <a:blip r:embed="rId3"/>
+          <a:blip r:embed="rId4"/>
           <a:stretch>
             <a:fillRect/>
           </a:stretch>
@@ -24031,7 +24569,7 @@
           <p:nvPr/>
         </p:nvPicPr>
         <p:blipFill>
-          <a:blip r:embed="rId4"/>
+          <a:blip r:embed="rId5"/>
           <a:stretch>
             <a:fillRect/>
           </a:stretch>

</xml_diff>